<commit_message>
remoção de ficheiros desnecessários
</commit_message>
<xml_diff>
--- a/versao03/CaixeiroViajante_apresentacao.pptx
+++ b/versao03/CaixeiroViajante_apresentacao.pptx
@@ -265,7 +265,7 @@
             <a:fld id="{1467EF9E-1714-47D4-B610-DAC8E9331003}" type="datetimeFigureOut">
               <a:rPr lang="pt-PT" smtClean="0"/>
               <a:pPr/>
-              <a:t>19-04-2012</a:t>
+              <a:t>26-04-2012</a:t>
             </a:fld>
             <a:endParaRPr lang="pt-PT"/>
           </a:p>
@@ -626,7 +626,7 @@
             <a:fld id="{1467EF9E-1714-47D4-B610-DAC8E9331003}" type="datetimeFigureOut">
               <a:rPr lang="pt-PT" smtClean="0"/>
               <a:pPr/>
-              <a:t>19-04-2012</a:t>
+              <a:t>26-04-2012</a:t>
             </a:fld>
             <a:endParaRPr lang="pt-PT"/>
           </a:p>
@@ -803,7 +803,7 @@
             <a:fld id="{1467EF9E-1714-47D4-B610-DAC8E9331003}" type="datetimeFigureOut">
               <a:rPr lang="pt-PT" smtClean="0"/>
               <a:pPr/>
-              <a:t>19-04-2012</a:t>
+              <a:t>26-04-2012</a:t>
             </a:fld>
             <a:endParaRPr lang="pt-PT"/>
           </a:p>
@@ -1040,7 +1040,7 @@
             <a:fld id="{1467EF9E-1714-47D4-B610-DAC8E9331003}" type="datetimeFigureOut">
               <a:rPr lang="pt-PT" smtClean="0"/>
               <a:pPr/>
-              <a:t>19-04-2012</a:t>
+              <a:t>26-04-2012</a:t>
             </a:fld>
             <a:endParaRPr lang="pt-PT"/>
           </a:p>
@@ -1311,7 +1311,7 @@
             <a:fld id="{1467EF9E-1714-47D4-B610-DAC8E9331003}" type="datetimeFigureOut">
               <a:rPr lang="pt-PT" smtClean="0"/>
               <a:pPr/>
-              <a:t>19-04-2012</a:t>
+              <a:t>26-04-2012</a:t>
             </a:fld>
             <a:endParaRPr lang="pt-PT"/>
           </a:p>
@@ -1533,7 +1533,7 @@
             <a:fld id="{1467EF9E-1714-47D4-B610-DAC8E9331003}" type="datetimeFigureOut">
               <a:rPr lang="pt-PT" smtClean="0"/>
               <a:pPr/>
-              <a:t>19-04-2012</a:t>
+              <a:t>26-04-2012</a:t>
             </a:fld>
             <a:endParaRPr lang="pt-PT"/>
           </a:p>
@@ -1887,7 +1887,7 @@
             <a:fld id="{1467EF9E-1714-47D4-B610-DAC8E9331003}" type="datetimeFigureOut">
               <a:rPr lang="pt-PT" smtClean="0"/>
               <a:pPr/>
-              <a:t>19-04-2012</a:t>
+              <a:t>26-04-2012</a:t>
             </a:fld>
             <a:endParaRPr lang="pt-PT"/>
           </a:p>
@@ -2121,7 +2121,7 @@
             <a:fld id="{1467EF9E-1714-47D4-B610-DAC8E9331003}" type="datetimeFigureOut">
               <a:rPr lang="pt-PT" smtClean="0"/>
               <a:pPr/>
-              <a:t>19-04-2012</a:t>
+              <a:t>26-04-2012</a:t>
             </a:fld>
             <a:endParaRPr lang="pt-PT"/>
           </a:p>
@@ -2263,7 +2263,7 @@
             <a:fld id="{1467EF9E-1714-47D4-B610-DAC8E9331003}" type="datetimeFigureOut">
               <a:rPr lang="pt-PT" smtClean="0"/>
               <a:pPr/>
-              <a:t>19-04-2012</a:t>
+              <a:t>26-04-2012</a:t>
             </a:fld>
             <a:endParaRPr lang="pt-PT"/>
           </a:p>
@@ -2542,7 +2542,7 @@
             <a:fld id="{1467EF9E-1714-47D4-B610-DAC8E9331003}" type="datetimeFigureOut">
               <a:rPr lang="pt-PT" smtClean="0"/>
               <a:pPr/>
-              <a:t>19-04-2012</a:t>
+              <a:t>26-04-2012</a:t>
             </a:fld>
             <a:endParaRPr lang="pt-PT"/>
           </a:p>
@@ -2951,7 +2951,7 @@
             <a:fld id="{1467EF9E-1714-47D4-B610-DAC8E9331003}" type="datetimeFigureOut">
               <a:rPr lang="pt-PT" smtClean="0"/>
               <a:pPr/>
-              <a:t>19-04-2012</a:t>
+              <a:t>26-04-2012</a:t>
             </a:fld>
             <a:endParaRPr lang="pt-PT"/>
           </a:p>
@@ -3291,7 +3291,7 @@
             <a:fld id="{1467EF9E-1714-47D4-B610-DAC8E9331003}" type="datetimeFigureOut">
               <a:rPr lang="pt-PT" smtClean="0"/>
               <a:pPr/>
-              <a:t>19-04-2012</a:t>
+              <a:t>26-04-2012</a:t>
             </a:fld>
             <a:endParaRPr lang="pt-PT"/>
           </a:p>
@@ -4937,7 +4937,7 @@
       </p:sp>
       <p:pic>
         <p:nvPicPr>
-          <p:cNvPr id="11267" name="Picture 3"/>
+          <p:cNvPr id="21506" name="Picture 2"/>
           <p:cNvPicPr>
             <a:picLocks noChangeAspect="1" noChangeArrowheads="1"/>
           </p:cNvPicPr>
@@ -4952,8 +4952,8 @@
         </p:blipFill>
         <p:spPr bwMode="auto">
           <a:xfrm>
-            <a:off x="827584" y="1772816"/>
-            <a:ext cx="7272808" cy="3456384"/>
+            <a:off x="755576" y="1772816"/>
+            <a:ext cx="7416824" cy="3736506"/>
           </a:xfrm>
           <a:prstGeom prst="rect">
             <a:avLst/>

</xml_diff>

<commit_message>
Entrega de Operador PMX e Inversion
</commit_message>
<xml_diff>
--- a/versao03/CaixeiroViajante_apresentacao.pptx
+++ b/versao03/CaixeiroViajante_apresentacao.pptx
@@ -16,10 +16,20 @@
     <p:sldId id="264" r:id="rId10"/>
     <p:sldId id="265" r:id="rId11"/>
     <p:sldId id="266" r:id="rId12"/>
-    <p:sldId id="267" r:id="rId13"/>
-    <p:sldId id="268" r:id="rId14"/>
-    <p:sldId id="269" r:id="rId15"/>
-    <p:sldId id="270" r:id="rId16"/>
+    <p:sldId id="272" r:id="rId13"/>
+    <p:sldId id="273" r:id="rId14"/>
+    <p:sldId id="274" r:id="rId15"/>
+    <p:sldId id="275" r:id="rId16"/>
+    <p:sldId id="276" r:id="rId17"/>
+    <p:sldId id="277" r:id="rId18"/>
+    <p:sldId id="278" r:id="rId19"/>
+    <p:sldId id="267" r:id="rId20"/>
+    <p:sldId id="268" r:id="rId21"/>
+    <p:sldId id="269" r:id="rId22"/>
+    <p:sldId id="270" r:id="rId23"/>
+    <p:sldId id="279" r:id="rId24"/>
+    <p:sldId id="280" r:id="rId25"/>
+    <p:sldId id="281" r:id="rId26"/>
   </p:sldIdLst>
   <p:sldSz cx="9144000" cy="6858000" type="screen4x3"/>
   <p:notesSz cx="6858000" cy="9144000"/>
@@ -265,7 +275,7 @@
             <a:fld id="{1467EF9E-1714-47D4-B610-DAC8E9331003}" type="datetimeFigureOut">
               <a:rPr lang="pt-PT" smtClean="0"/>
               <a:pPr/>
-              <a:t>26-04-2012</a:t>
+              <a:t>03-05-2012</a:t>
             </a:fld>
             <a:endParaRPr lang="pt-PT"/>
           </a:p>
@@ -626,7 +636,7 @@
             <a:fld id="{1467EF9E-1714-47D4-B610-DAC8E9331003}" type="datetimeFigureOut">
               <a:rPr lang="pt-PT" smtClean="0"/>
               <a:pPr/>
-              <a:t>26-04-2012</a:t>
+              <a:t>03-05-2012</a:t>
             </a:fld>
             <a:endParaRPr lang="pt-PT"/>
           </a:p>
@@ -803,7 +813,7 @@
             <a:fld id="{1467EF9E-1714-47D4-B610-DAC8E9331003}" type="datetimeFigureOut">
               <a:rPr lang="pt-PT" smtClean="0"/>
               <a:pPr/>
-              <a:t>26-04-2012</a:t>
+              <a:t>03-05-2012</a:t>
             </a:fld>
             <a:endParaRPr lang="pt-PT"/>
           </a:p>
@@ -1040,7 +1050,7 @@
             <a:fld id="{1467EF9E-1714-47D4-B610-DAC8E9331003}" type="datetimeFigureOut">
               <a:rPr lang="pt-PT" smtClean="0"/>
               <a:pPr/>
-              <a:t>26-04-2012</a:t>
+              <a:t>03-05-2012</a:t>
             </a:fld>
             <a:endParaRPr lang="pt-PT"/>
           </a:p>
@@ -1311,7 +1321,7 @@
             <a:fld id="{1467EF9E-1714-47D4-B610-DAC8E9331003}" type="datetimeFigureOut">
               <a:rPr lang="pt-PT" smtClean="0"/>
               <a:pPr/>
-              <a:t>26-04-2012</a:t>
+              <a:t>03-05-2012</a:t>
             </a:fld>
             <a:endParaRPr lang="pt-PT"/>
           </a:p>
@@ -1533,7 +1543,7 @@
             <a:fld id="{1467EF9E-1714-47D4-B610-DAC8E9331003}" type="datetimeFigureOut">
               <a:rPr lang="pt-PT" smtClean="0"/>
               <a:pPr/>
-              <a:t>26-04-2012</a:t>
+              <a:t>03-05-2012</a:t>
             </a:fld>
             <a:endParaRPr lang="pt-PT"/>
           </a:p>
@@ -1887,7 +1897,7 @@
             <a:fld id="{1467EF9E-1714-47D4-B610-DAC8E9331003}" type="datetimeFigureOut">
               <a:rPr lang="pt-PT" smtClean="0"/>
               <a:pPr/>
-              <a:t>26-04-2012</a:t>
+              <a:t>03-05-2012</a:t>
             </a:fld>
             <a:endParaRPr lang="pt-PT"/>
           </a:p>
@@ -2121,7 +2131,7 @@
             <a:fld id="{1467EF9E-1714-47D4-B610-DAC8E9331003}" type="datetimeFigureOut">
               <a:rPr lang="pt-PT" smtClean="0"/>
               <a:pPr/>
-              <a:t>26-04-2012</a:t>
+              <a:t>03-05-2012</a:t>
             </a:fld>
             <a:endParaRPr lang="pt-PT"/>
           </a:p>
@@ -2263,7 +2273,7 @@
             <a:fld id="{1467EF9E-1714-47D4-B610-DAC8E9331003}" type="datetimeFigureOut">
               <a:rPr lang="pt-PT" smtClean="0"/>
               <a:pPr/>
-              <a:t>26-04-2012</a:t>
+              <a:t>03-05-2012</a:t>
             </a:fld>
             <a:endParaRPr lang="pt-PT"/>
           </a:p>
@@ -2542,7 +2552,7 @@
             <a:fld id="{1467EF9E-1714-47D4-B610-DAC8E9331003}" type="datetimeFigureOut">
               <a:rPr lang="pt-PT" smtClean="0"/>
               <a:pPr/>
-              <a:t>26-04-2012</a:t>
+              <a:t>03-05-2012</a:t>
             </a:fld>
             <a:endParaRPr lang="pt-PT"/>
           </a:p>
@@ -2951,7 +2961,7 @@
             <a:fld id="{1467EF9E-1714-47D4-B610-DAC8E9331003}" type="datetimeFigureOut">
               <a:rPr lang="pt-PT" smtClean="0"/>
               <a:pPr/>
-              <a:t>26-04-2012</a:t>
+              <a:t>03-05-2012</a:t>
             </a:fld>
             <a:endParaRPr lang="pt-PT"/>
           </a:p>
@@ -3291,7 +3301,7 @@
             <a:fld id="{1467EF9E-1714-47D4-B610-DAC8E9331003}" type="datetimeFigureOut">
               <a:rPr lang="pt-PT" smtClean="0"/>
               <a:pPr/>
-              <a:t>26-04-2012</a:t>
+              <a:t>03-05-2012</a:t>
             </a:fld>
             <a:endParaRPr lang="pt-PT"/>
           </a:p>
@@ -3971,7 +3981,31 @@
                   <a:srgbClr val="0070C0"/>
                 </a:solidFill>
               </a:rPr>
-              <a:t>Operador: OrderCrossover</a:t>
+              <a:t>Operador: </a:t>
+            </a:r>
+            <a:r>
+              <a:rPr lang="pt-PT" dirty="0" err="1" smtClean="0">
+                <a:solidFill>
+                  <a:srgbClr val="0070C0"/>
+                </a:solidFill>
+              </a:rPr>
+              <a:t>Cycle</a:t>
+            </a:r>
+            <a:r>
+              <a:rPr lang="pt-PT" dirty="0" smtClean="0">
+                <a:solidFill>
+                  <a:srgbClr val="0070C0"/>
+                </a:solidFill>
+              </a:rPr>
+              <a:t> </a:t>
+            </a:r>
+            <a:r>
+              <a:rPr lang="pt-PT" dirty="0" err="1" smtClean="0">
+                <a:solidFill>
+                  <a:srgbClr val="0070C0"/>
+                </a:solidFill>
+              </a:rPr>
+              <a:t>Crossover</a:t>
             </a:r>
             <a:endParaRPr lang="pt-PT" dirty="0"/>
           </a:p>
@@ -4418,7 +4452,31 @@
                   <a:srgbClr val="0070C0"/>
                 </a:solidFill>
               </a:rPr>
-              <a:t>Operador: OrderCrossover</a:t>
+              <a:t>Operador: </a:t>
+            </a:r>
+            <a:r>
+              <a:rPr lang="pt-PT" dirty="0" err="1" smtClean="0">
+                <a:solidFill>
+                  <a:srgbClr val="0070C0"/>
+                </a:solidFill>
+              </a:rPr>
+              <a:t>Cycle</a:t>
+            </a:r>
+            <a:r>
+              <a:rPr lang="pt-PT" dirty="0" smtClean="0">
+                <a:solidFill>
+                  <a:srgbClr val="0070C0"/>
+                </a:solidFill>
+              </a:rPr>
+              <a:t> </a:t>
+            </a:r>
+            <a:r>
+              <a:rPr lang="pt-PT" dirty="0" err="1" smtClean="0">
+                <a:solidFill>
+                  <a:srgbClr val="0070C0"/>
+                </a:solidFill>
+              </a:rPr>
+              <a:t>Crossover</a:t>
             </a:r>
             <a:endParaRPr lang="pt-PT" dirty="0"/>
           </a:p>
@@ -4747,7 +4805,15 @@
                   <a:srgbClr val="0070C0"/>
                 </a:solidFill>
               </a:rPr>
-              <a:t>Operador: SUS - Minimização</a:t>
+              <a:t>Operador: PMX - </a:t>
+            </a:r>
+            <a:r>
+              <a:rPr lang="pt-PT" dirty="0" err="1" smtClean="0">
+                <a:solidFill>
+                  <a:srgbClr val="0070C0"/>
+                </a:solidFill>
+              </a:rPr>
+              <a:t>Crossover</a:t>
             </a:r>
             <a:endParaRPr lang="pt-PT" dirty="0"/>
           </a:p>
@@ -4770,57 +4836,45 @@
           <a:p>
             <a:r>
               <a:rPr lang="pt-PT" dirty="0" smtClean="0"/>
-              <a:t>Problema: </a:t>
-            </a:r>
+              <a:t>São gerados dois pontos de corte aleatórios e </a:t>
+            </a:r>
+            <a:r>
+              <a:rPr lang="pt-PT" dirty="0" err="1" smtClean="0"/>
+              <a:t>apartir</a:t>
+            </a:r>
+            <a:r>
+              <a:rPr lang="pt-PT" dirty="0" smtClean="0"/>
+              <a:t> desses pontos são mapeados os genes entre os pontos de corte do pai para a mãe e vice versa.</a:t>
+            </a:r>
+          </a:p>
+          <a:p>
+            <a:endParaRPr lang="pt-PT" dirty="0" smtClean="0"/>
           </a:p>
           <a:p>
             <a:pPr lvl="1"/>
             <a:r>
               <a:rPr lang="pt-PT" dirty="0" smtClean="0"/>
-              <a:t>O operador SUS seleciona o fitness mais alto, por isso é preciso adaptá-lo para passar a selecionar o mais baixo e poder assim utilizá-lo no caixeiro viajante.</a:t>
+              <a:t>Passo 1: Gerar dois pontos aleatórios</a:t>
             </a:r>
           </a:p>
           <a:p>
             <a:endParaRPr lang="pt-PT" dirty="0" smtClean="0"/>
           </a:p>
           <a:p>
-            <a:r>
-              <a:rPr lang="pt-PT" dirty="0" smtClean="0"/>
-              <a:t>Esquema:</a:t>
-            </a:r>
-          </a:p>
-          <a:p>
             <a:endParaRPr lang="pt-PT" dirty="0" smtClean="0"/>
           </a:p>
           <a:p>
             <a:endParaRPr lang="pt-PT" dirty="0" smtClean="0"/>
           </a:p>
           <a:p>
+            <a:pPr lvl="1"/>
             <a:endParaRPr lang="pt-PT" dirty="0" smtClean="0"/>
-          </a:p>
-          <a:p>
-            <a:pPr lvl="1"/>
-            <a:r>
-              <a:rPr lang="pt-PT" dirty="0" smtClean="0"/>
-              <a:t>Max(População)=12</a:t>
-            </a:r>
-          </a:p>
-          <a:p>
-            <a:pPr lvl="1"/>
-            <a:r>
-              <a:rPr lang="pt-PT" dirty="0" smtClean="0"/>
-              <a:t>Min(População)=1</a:t>
-            </a:r>
-          </a:p>
-          <a:p>
-            <a:pPr lvl="1"/>
-            <a:endParaRPr lang="pt-PT" dirty="0"/>
           </a:p>
         </p:txBody>
       </p:sp>
       <p:pic>
         <p:nvPicPr>
-          <p:cNvPr id="10244" name="Picture 4"/>
+          <p:cNvPr id="21512" name="Picture 8"/>
           <p:cNvPicPr>
             <a:picLocks noChangeAspect="1" noChangeArrowheads="1"/>
           </p:cNvPicPr>
@@ -4835,8 +4889,8 @@
         </p:blipFill>
         <p:spPr bwMode="auto">
           <a:xfrm>
-            <a:off x="755576" y="3789040"/>
-            <a:ext cx="7056784" cy="1368152"/>
+            <a:off x="755576" y="3573016"/>
+            <a:ext cx="7686675" cy="1371600"/>
           </a:xfrm>
           <a:prstGeom prst="rect">
             <a:avLst/>
@@ -4903,7 +4957,15 @@
                   <a:srgbClr val="0070C0"/>
                 </a:solidFill>
               </a:rPr>
-              <a:t>Operador: SUS - Minimização</a:t>
+              <a:t>Operador: PMX - </a:t>
+            </a:r>
+            <a:r>
+              <a:rPr lang="pt-PT" dirty="0" err="1" smtClean="0">
+                <a:solidFill>
+                  <a:srgbClr val="0070C0"/>
+                </a:solidFill>
+              </a:rPr>
+              <a:t>Crossover</a:t>
             </a:r>
             <a:endParaRPr lang="pt-PT" dirty="0"/>
           </a:p>
@@ -4924,13 +4986,11 @@
           <a:bodyPr/>
           <a:lstStyle/>
           <a:p>
+            <a:pPr lvl="1"/>
             <a:r>
               <a:rPr lang="pt-PT" dirty="0" smtClean="0"/>
-              <a:t>PseudoCodigo : Calcular novo fitness</a:t>
-            </a:r>
-          </a:p>
-          <a:p>
-            <a:pPr lvl="1"/>
+              <a:t>Passo 2: Os genes do pai entre os pontos ficam no filho2 e os da mãe no filho1.</a:t>
+            </a:r>
             <a:endParaRPr lang="pt-PT" dirty="0"/>
           </a:p>
         </p:txBody>
@@ -4952,8 +5012,8 @@
         </p:blipFill>
         <p:spPr bwMode="auto">
           <a:xfrm>
-            <a:off x="755576" y="1772816"/>
-            <a:ext cx="7416824" cy="3736506"/>
+            <a:off x="755576" y="2780928"/>
+            <a:ext cx="7686675" cy="1371600"/>
           </a:xfrm>
           <a:prstGeom prst="rect">
             <a:avLst/>
@@ -4967,18 +5027,43 @@
           </a:ln>
         </p:spPr>
       </p:pic>
+      <p:pic>
+        <p:nvPicPr>
+          <p:cNvPr id="21508" name="Picture 4"/>
+          <p:cNvPicPr>
+            <a:picLocks noChangeAspect="1" noChangeArrowheads="1"/>
+          </p:cNvPicPr>
+          <p:nvPr/>
+        </p:nvPicPr>
+        <p:blipFill>
+          <a:blip r:embed="rId3" cstate="print"/>
+          <a:srcRect/>
+          <a:stretch>
+            <a:fillRect/>
+          </a:stretch>
+        </p:blipFill>
+        <p:spPr bwMode="auto">
+          <a:xfrm>
+            <a:off x="683568" y="4581128"/>
+            <a:ext cx="7753350" cy="1371600"/>
+          </a:xfrm>
+          <a:prstGeom prst="rect">
+            <a:avLst/>
+          </a:prstGeom>
+          <a:noFill/>
+          <a:ln w="9525">
+            <a:noFill/>
+            <a:miter lim="800000"/>
+            <a:headEnd/>
+            <a:tailEnd/>
+          </a:ln>
+        </p:spPr>
+      </p:pic>
     </p:spTree>
   </p:cSld>
   <p:clrMapOvr>
     <a:masterClrMapping/>
   </p:clrMapOvr>
-  <p:timing>
-    <p:tnLst>
-      <p:par>
-        <p:cTn id="1" dur="indefinite" restart="never" nodeType="tmRoot"/>
-      </p:par>
-    </p:tnLst>
-  </p:timing>
 </p:sld>
 </file>
 
@@ -5020,7 +5105,15 @@
                   <a:srgbClr val="0070C0"/>
                 </a:solidFill>
               </a:rPr>
-              <a:t>Operador: SUS - Minimização</a:t>
+              <a:t>Operador: PMX - </a:t>
+            </a:r>
+            <a:r>
+              <a:rPr lang="pt-PT" dirty="0" err="1" smtClean="0">
+                <a:solidFill>
+                  <a:srgbClr val="0070C0"/>
+                </a:solidFill>
+              </a:rPr>
+              <a:t>Crossover</a:t>
             </a:r>
             <a:endParaRPr lang="pt-PT" dirty="0"/>
           </a:p>
@@ -5041,49 +5134,35 @@
           <a:bodyPr/>
           <a:lstStyle/>
           <a:p>
+            <a:pPr lvl="1"/>
             <a:r>
               <a:rPr lang="pt-PT" dirty="0" smtClean="0"/>
-              <a:t>Novos valores de fitness:</a:t>
-            </a:r>
-          </a:p>
-          <a:p>
-            <a:endParaRPr lang="pt-PT" dirty="0" smtClean="0"/>
-          </a:p>
-          <a:p>
-            <a:endParaRPr lang="pt-PT" dirty="0" smtClean="0"/>
+              <a:t>Passo 3:  Para os genes que foram trocados coloca-se o gene pelo qual foi trocado, no sitio onde ele se encontrava anteriormente.</a:t>
+            </a:r>
           </a:p>
           <a:p>
             <a:pPr lvl="1"/>
-            <a:endParaRPr lang="pt-PT" dirty="0" smtClean="0"/>
-          </a:p>
-          <a:p>
-            <a:pPr lvl="1"/>
-            <a:r>
-              <a:rPr lang="en-US" sz="2500" dirty="0" smtClean="0"/>
-              <a:t>Novo Fitness = (12 + 1) - Fitness</a:t>
-            </a:r>
-            <a:endParaRPr lang="pt-PT" sz="1700" dirty="0" smtClean="0"/>
-          </a:p>
-          <a:p>
-            <a:pPr lvl="1"/>
-            <a:r>
-              <a:rPr lang="en-US" sz="2500" dirty="0" smtClean="0"/>
-              <a:t>Novo Fitness A = 13 – 10 = 3</a:t>
-            </a:r>
-          </a:p>
-          <a:p>
-            <a:pPr lvl="1"/>
-            <a:endParaRPr lang="en-US" sz="2500" dirty="0" smtClean="0"/>
-          </a:p>
-          <a:p>
-            <a:r>
-              <a:rPr lang="pt-PT" dirty="0" smtClean="0"/>
-              <a:t>Fazendo esta conversão do fitness, o fitness com valor mais alto passa a ter o valor mais baixo, o que torna possível a utilização do operador SUS.</a:t>
-            </a:r>
-          </a:p>
-          <a:p>
-            <a:pPr lvl="1"/>
-            <a:endParaRPr lang="pt-PT" dirty="0" smtClean="0"/>
+            <a:r>
+              <a:rPr lang="pt-PT" dirty="0" smtClean="0">
+                <a:solidFill>
+                  <a:srgbClr val="0070C0"/>
+                </a:solidFill>
+              </a:rPr>
+              <a:t>Exemplo para o filho1: </a:t>
+            </a:r>
+            <a:r>
+              <a:rPr lang="pt-PT" dirty="0" smtClean="0">
+                <a:solidFill>
+                  <a:schemeClr val="tx1"/>
+                </a:solidFill>
+              </a:rPr>
+              <a:t>Troca o 6 pelo 3;</a:t>
+            </a:r>
+            <a:endParaRPr lang="pt-PT" dirty="0" smtClean="0">
+              <a:solidFill>
+                <a:srgbClr val="0070C0"/>
+              </a:solidFill>
+            </a:endParaRPr>
           </a:p>
           <a:p>
             <a:pPr lvl="1"/>
@@ -5093,7 +5172,7 @@
       </p:sp>
       <p:pic>
         <p:nvPicPr>
-          <p:cNvPr id="12292" name="Picture 4"/>
+          <p:cNvPr id="22532" name="Picture 4"/>
           <p:cNvPicPr>
             <a:picLocks noChangeAspect="1" noChangeArrowheads="1"/>
           </p:cNvPicPr>
@@ -5108,8 +5187,8 @@
         </p:blipFill>
         <p:spPr bwMode="auto">
           <a:xfrm>
-            <a:off x="1547664" y="1772816"/>
-            <a:ext cx="5467350" cy="1009650"/>
+            <a:off x="683568" y="2780928"/>
+            <a:ext cx="7753350" cy="3171825"/>
           </a:xfrm>
           <a:prstGeom prst="rect">
             <a:avLst/>
@@ -5128,13 +5207,6 @@
   <p:clrMapOvr>
     <a:masterClrMapping/>
   </p:clrMapOvr>
-  <p:timing>
-    <p:tnLst>
-      <p:par>
-        <p:cTn id="1" dur="indefinite" restart="never" nodeType="tmRoot"/>
-      </p:par>
-    </p:tnLst>
-  </p:timing>
 </p:sld>
 </file>
 
@@ -5176,7 +5248,15 @@
                   <a:srgbClr val="0070C0"/>
                 </a:solidFill>
               </a:rPr>
-              <a:t>Operador: Swap Genes - Mutação</a:t>
+              <a:t>Operador: PMX - </a:t>
+            </a:r>
+            <a:r>
+              <a:rPr lang="pt-PT" dirty="0" err="1" smtClean="0">
+                <a:solidFill>
+                  <a:srgbClr val="0070C0"/>
+                </a:solidFill>
+              </a:rPr>
+              <a:t>Crossover</a:t>
             </a:r>
             <a:endParaRPr lang="pt-PT" dirty="0"/>
           </a:p>
@@ -5197,32 +5277,34 @@
           <a:bodyPr/>
           <a:lstStyle/>
           <a:p>
-            <a:r>
-              <a:rPr lang="pt-PT" dirty="0" smtClean="0"/>
-              <a:t>Descrição:</a:t>
-            </a:r>
-          </a:p>
-          <a:p>
             <a:pPr lvl="1"/>
-            <a:r>
-              <a:rPr lang="pt-PT" dirty="0" smtClean="0"/>
-              <a:t>Escolher dois alelos aleatórios de um indivíduo, e trocá-los de sítio.</a:t>
-            </a:r>
-          </a:p>
-          <a:p>
-            <a:r>
-              <a:rPr lang="pt-PT" dirty="0" smtClean="0"/>
-              <a:t>Esquema:</a:t>
-            </a:r>
-          </a:p>
-          <a:p>
-            <a:endParaRPr lang="pt-PT" dirty="0" smtClean="0"/>
+            <a:endParaRPr lang="pt-PT" dirty="0" smtClean="0">
+              <a:solidFill>
+                <a:schemeClr val="tx1"/>
+              </a:solidFill>
+            </a:endParaRPr>
+          </a:p>
+          <a:p>
+            <a:pPr lvl="1"/>
+            <a:r>
+              <a:rPr lang="pt-PT" dirty="0" smtClean="0">
+                <a:solidFill>
+                  <a:schemeClr val="tx1"/>
+                </a:solidFill>
+              </a:rPr>
+              <a:t>Troca o 2 pelo 4;</a:t>
+            </a:r>
+            <a:endParaRPr lang="pt-PT" dirty="0">
+              <a:solidFill>
+                <a:schemeClr val="tx1"/>
+              </a:solidFill>
+            </a:endParaRPr>
           </a:p>
         </p:txBody>
       </p:sp>
       <p:pic>
         <p:nvPicPr>
-          <p:cNvPr id="13314" name="Picture 2"/>
+          <p:cNvPr id="23554" name="Picture 2"/>
           <p:cNvPicPr>
             <a:picLocks noChangeAspect="1" noChangeArrowheads="1"/>
           </p:cNvPicPr>
@@ -5237,8 +5319,8 @@
         </p:blipFill>
         <p:spPr bwMode="auto">
           <a:xfrm>
-            <a:off x="2123728" y="2996952"/>
-            <a:ext cx="4680520" cy="3312368"/>
+            <a:off x="683568" y="2780928"/>
+            <a:ext cx="7753350" cy="3171825"/>
           </a:xfrm>
           <a:prstGeom prst="rect">
             <a:avLst/>
@@ -5252,206 +5334,540 @@
           </a:ln>
         </p:spPr>
       </p:pic>
-      <p:sp>
-        <p:nvSpPr>
-          <p:cNvPr id="13315" name="AutoShape 3"/>
-          <p:cNvSpPr>
-            <a:spLocks noChangeArrowheads="1"/>
-          </p:cNvSpPr>
+    </p:spTree>
+  </p:cSld>
+  <p:clrMapOvr>
+    <a:masterClrMapping/>
+  </p:clrMapOvr>
+</p:sld>
+</file>
+
+<file path=ppt/slides/slide16.xml><?xml version="1.0" encoding="utf-8"?>
+<p:sld xmlns:a="http://schemas.openxmlformats.org/drawingml/2006/main" xmlns:r="http://schemas.openxmlformats.org/officeDocument/2006/relationships" xmlns:p="http://schemas.openxmlformats.org/presentationml/2006/main">
+  <p:cSld>
+    <p:spTree>
+      <p:nvGrpSpPr>
+        <p:cNvPr id="1" name=""/>
+        <p:cNvGrpSpPr/>
+        <p:nvPr/>
+      </p:nvGrpSpPr>
+      <p:grpSpPr>
+        <a:xfrm>
+          <a:off x="0" y="0"/>
+          <a:ext cx="0" cy="0"/>
+          <a:chOff x="0" y="0"/>
+          <a:chExt cx="0" cy="0"/>
+        </a:xfrm>
+      </p:grpSpPr>
+      <p:sp>
+        <p:nvSpPr>
+          <p:cNvPr id="2" name="Título 1"/>
+          <p:cNvSpPr>
+            <a:spLocks noGrp="1"/>
+          </p:cNvSpPr>
+          <p:nvPr>
+            <p:ph type="title"/>
+          </p:nvPr>
+        </p:nvSpPr>
+        <p:spPr/>
+        <p:txBody>
+          <a:bodyPr/>
+          <a:lstStyle/>
+          <a:p>
+            <a:r>
+              <a:rPr lang="pt-PT" dirty="0" smtClean="0">
+                <a:solidFill>
+                  <a:srgbClr val="0070C0"/>
+                </a:solidFill>
+              </a:rPr>
+              <a:t>Operador: PMX - </a:t>
+            </a:r>
+            <a:r>
+              <a:rPr lang="pt-PT" dirty="0" err="1" smtClean="0">
+                <a:solidFill>
+                  <a:srgbClr val="0070C0"/>
+                </a:solidFill>
+              </a:rPr>
+              <a:t>Crossover</a:t>
+            </a:r>
+            <a:endParaRPr lang="pt-PT" dirty="0"/>
+          </a:p>
+        </p:txBody>
+      </p:sp>
+      <p:sp>
+        <p:nvSpPr>
+          <p:cNvPr id="3" name="Marcador de Posição de Conteúdo 2"/>
+          <p:cNvSpPr>
+            <a:spLocks noGrp="1"/>
+          </p:cNvSpPr>
+          <p:nvPr>
+            <p:ph sz="quarter" idx="1"/>
+          </p:nvPr>
+        </p:nvSpPr>
+        <p:spPr/>
+        <p:txBody>
+          <a:bodyPr/>
+          <a:lstStyle/>
+          <a:p>
+            <a:pPr lvl="1"/>
+            <a:endParaRPr lang="pt-PT" dirty="0" smtClean="0">
+              <a:solidFill>
+                <a:schemeClr val="tx1"/>
+              </a:solidFill>
+            </a:endParaRPr>
+          </a:p>
+          <a:p>
+            <a:pPr lvl="1"/>
+            <a:r>
+              <a:rPr lang="pt-PT" dirty="0" smtClean="0">
+                <a:solidFill>
+                  <a:schemeClr val="tx1"/>
+                </a:solidFill>
+              </a:rPr>
+              <a:t>Troca o 8 pelo 5;</a:t>
+            </a:r>
+            <a:endParaRPr lang="pt-PT" dirty="0">
+              <a:solidFill>
+                <a:schemeClr val="tx1"/>
+              </a:solidFill>
+            </a:endParaRPr>
+          </a:p>
+        </p:txBody>
+      </p:sp>
+      <p:pic>
+        <p:nvPicPr>
+          <p:cNvPr id="24578" name="Picture 2"/>
+          <p:cNvPicPr>
+            <a:picLocks noChangeAspect="1" noChangeArrowheads="1"/>
+          </p:cNvPicPr>
           <p:nvPr/>
-        </p:nvSpPr>
+        </p:nvPicPr>
+        <p:blipFill>
+          <a:blip r:embed="rId2" cstate="print"/>
+          <a:srcRect/>
+          <a:stretch>
+            <a:fillRect/>
+          </a:stretch>
+        </p:blipFill>
         <p:spPr bwMode="auto">
           <a:xfrm>
-            <a:off x="3635896" y="4149080"/>
-            <a:ext cx="361950" cy="257175"/>
-          </a:xfrm>
-          <a:prstGeom prst="upArrow">
-            <a:avLst>
-              <a:gd name="adj1" fmla="val 50000"/>
-              <a:gd name="adj2" fmla="val 25000"/>
-            </a:avLst>
+            <a:off x="683568" y="2780928"/>
+            <a:ext cx="7753350" cy="3171825"/>
+          </a:xfrm>
+          <a:prstGeom prst="rect">
+            <a:avLst/>
           </a:prstGeom>
-          <a:solidFill>
-            <a:srgbClr val="4F81BD"/>
-          </a:solidFill>
-          <a:ln w="38100">
-            <a:solidFill>
-              <a:srgbClr val="F2F2F2"/>
-            </a:solidFill>
+          <a:noFill/>
+          <a:ln w="9525">
+            <a:noFill/>
             <a:miter lim="800000"/>
             <a:headEnd/>
             <a:tailEnd/>
           </a:ln>
-          <a:effectLst>
-            <a:outerShdw dist="28398" dir="3806097" algn="ctr" rotWithShape="0">
-              <a:srgbClr val="243F60">
-                <a:alpha val="50000"/>
-              </a:srgbClr>
-            </a:outerShdw>
-          </a:effectLst>
-        </p:spPr>
-        <p:txBody>
-          <a:bodyPr vert="eaVert" wrap="square" lIns="91440" tIns="45720" rIns="91440" bIns="45720" numCol="1" anchor="t" anchorCtr="0" compatLnSpc="1">
-            <a:prstTxWarp prst="textNoShape">
-              <a:avLst/>
-            </a:prstTxWarp>
-          </a:bodyPr>
-          <a:lstStyle/>
-          <a:p>
-            <a:endParaRPr lang="pt-PT"/>
-          </a:p>
-        </p:txBody>
-      </p:sp>
-      <p:sp>
-        <p:nvSpPr>
-          <p:cNvPr id="13316" name="AutoShape 4"/>
-          <p:cNvSpPr>
-            <a:spLocks noChangeArrowheads="1"/>
-          </p:cNvSpPr>
+        </p:spPr>
+      </p:pic>
+    </p:spTree>
+  </p:cSld>
+  <p:clrMapOvr>
+    <a:masterClrMapping/>
+  </p:clrMapOvr>
+</p:sld>
+</file>
+
+<file path=ppt/slides/slide17.xml><?xml version="1.0" encoding="utf-8"?>
+<p:sld xmlns:a="http://schemas.openxmlformats.org/drawingml/2006/main" xmlns:r="http://schemas.openxmlformats.org/officeDocument/2006/relationships" xmlns:p="http://schemas.openxmlformats.org/presentationml/2006/main">
+  <p:cSld>
+    <p:spTree>
+      <p:nvGrpSpPr>
+        <p:cNvPr id="1" name=""/>
+        <p:cNvGrpSpPr/>
+        <p:nvPr/>
+      </p:nvGrpSpPr>
+      <p:grpSpPr>
+        <a:xfrm>
+          <a:off x="0" y="0"/>
+          <a:ext cx="0" cy="0"/>
+          <a:chOff x="0" y="0"/>
+          <a:chExt cx="0" cy="0"/>
+        </a:xfrm>
+      </p:grpSpPr>
+      <p:sp>
+        <p:nvSpPr>
+          <p:cNvPr id="2" name="Título 1"/>
+          <p:cNvSpPr>
+            <a:spLocks noGrp="1"/>
+          </p:cNvSpPr>
+          <p:nvPr>
+            <p:ph type="title"/>
+          </p:nvPr>
+        </p:nvSpPr>
+        <p:spPr/>
+        <p:txBody>
+          <a:bodyPr/>
+          <a:lstStyle/>
+          <a:p>
+            <a:r>
+              <a:rPr lang="pt-PT" dirty="0" smtClean="0">
+                <a:solidFill>
+                  <a:srgbClr val="0070C0"/>
+                </a:solidFill>
+              </a:rPr>
+              <a:t>Operador: PMX - </a:t>
+            </a:r>
+            <a:r>
+              <a:rPr lang="pt-PT" dirty="0" err="1" smtClean="0">
+                <a:solidFill>
+                  <a:srgbClr val="0070C0"/>
+                </a:solidFill>
+              </a:rPr>
+              <a:t>Crossover</a:t>
+            </a:r>
+            <a:endParaRPr lang="pt-PT" dirty="0"/>
+          </a:p>
+        </p:txBody>
+      </p:sp>
+      <p:sp>
+        <p:nvSpPr>
+          <p:cNvPr id="3" name="Marcador de Posição de Conteúdo 2"/>
+          <p:cNvSpPr>
+            <a:spLocks noGrp="1"/>
+          </p:cNvSpPr>
+          <p:nvPr>
+            <p:ph sz="quarter" idx="1"/>
+          </p:nvPr>
+        </p:nvSpPr>
+        <p:spPr/>
+        <p:txBody>
+          <a:bodyPr/>
+          <a:lstStyle/>
+          <a:p>
+            <a:endParaRPr lang="pt-PT" dirty="0" smtClean="0"/>
+          </a:p>
+          <a:p>
+            <a:pPr lvl="1"/>
+            <a:r>
+              <a:rPr lang="pt-PT" dirty="0" smtClean="0">
+                <a:solidFill>
+                  <a:schemeClr val="tx1"/>
+                </a:solidFill>
+              </a:rPr>
+              <a:t>Os restantes genes são iguais aos do Pai.</a:t>
+            </a:r>
+            <a:endParaRPr lang="pt-PT" dirty="0">
+              <a:solidFill>
+                <a:schemeClr val="tx1"/>
+              </a:solidFill>
+            </a:endParaRPr>
+          </a:p>
+        </p:txBody>
+      </p:sp>
+      <p:pic>
+        <p:nvPicPr>
+          <p:cNvPr id="25603" name="Picture 3"/>
+          <p:cNvPicPr>
+            <a:picLocks noChangeAspect="1" noChangeArrowheads="1"/>
+          </p:cNvPicPr>
           <p:nvPr/>
-        </p:nvSpPr>
+        </p:nvPicPr>
+        <p:blipFill>
+          <a:blip r:embed="rId2" cstate="print"/>
+          <a:srcRect/>
+          <a:stretch>
+            <a:fillRect/>
+          </a:stretch>
+        </p:blipFill>
         <p:spPr bwMode="auto">
           <a:xfrm>
-            <a:off x="6156176" y="4221088"/>
-            <a:ext cx="361950" cy="257175"/>
-          </a:xfrm>
-          <a:prstGeom prst="upArrow">
-            <a:avLst>
-              <a:gd name="adj1" fmla="val 50000"/>
-              <a:gd name="adj2" fmla="val 25000"/>
-            </a:avLst>
+            <a:off x="683568" y="2780928"/>
+            <a:ext cx="7753350" cy="3171825"/>
+          </a:xfrm>
+          <a:prstGeom prst="rect">
+            <a:avLst/>
           </a:prstGeom>
-          <a:solidFill>
-            <a:srgbClr val="9BBB59"/>
-          </a:solidFill>
-          <a:ln w="38100">
-            <a:solidFill>
-              <a:srgbClr val="F2F2F2"/>
-            </a:solidFill>
+          <a:noFill/>
+          <a:ln w="9525">
+            <a:noFill/>
             <a:miter lim="800000"/>
             <a:headEnd/>
             <a:tailEnd/>
           </a:ln>
-          <a:effectLst>
-            <a:outerShdw dist="28398" dir="3806097" algn="ctr" rotWithShape="0">
-              <a:srgbClr val="4E6128">
-                <a:alpha val="50000"/>
-              </a:srgbClr>
-            </a:outerShdw>
-          </a:effectLst>
-        </p:spPr>
-        <p:txBody>
-          <a:bodyPr vert="eaVert" wrap="square" lIns="91440" tIns="45720" rIns="91440" bIns="45720" numCol="1" anchor="t" anchorCtr="0" compatLnSpc="1">
-            <a:prstTxWarp prst="textNoShape">
-              <a:avLst/>
-            </a:prstTxWarp>
-          </a:bodyPr>
-          <a:lstStyle/>
-          <a:p>
-            <a:endParaRPr lang="pt-PT"/>
-          </a:p>
-        </p:txBody>
-      </p:sp>
-      <p:sp>
-        <p:nvSpPr>
-          <p:cNvPr id="13317" name="AutoShape 5"/>
-          <p:cNvSpPr>
-            <a:spLocks noChangeArrowheads="1"/>
-          </p:cNvSpPr>
+        </p:spPr>
+      </p:pic>
+    </p:spTree>
+  </p:cSld>
+  <p:clrMapOvr>
+    <a:masterClrMapping/>
+  </p:clrMapOvr>
+</p:sld>
+</file>
+
+<file path=ppt/slides/slide18.xml><?xml version="1.0" encoding="utf-8"?>
+<p:sld xmlns:a="http://schemas.openxmlformats.org/drawingml/2006/main" xmlns:r="http://schemas.openxmlformats.org/officeDocument/2006/relationships" xmlns:p="http://schemas.openxmlformats.org/presentationml/2006/main">
+  <p:cSld>
+    <p:spTree>
+      <p:nvGrpSpPr>
+        <p:cNvPr id="1" name=""/>
+        <p:cNvGrpSpPr/>
+        <p:nvPr/>
+      </p:nvGrpSpPr>
+      <p:grpSpPr>
+        <a:xfrm>
+          <a:off x="0" y="0"/>
+          <a:ext cx="0" cy="0"/>
+          <a:chOff x="0" y="0"/>
+          <a:chExt cx="0" cy="0"/>
+        </a:xfrm>
+      </p:grpSpPr>
+      <p:sp>
+        <p:nvSpPr>
+          <p:cNvPr id="2" name="Título 1"/>
+          <p:cNvSpPr>
+            <a:spLocks noGrp="1"/>
+          </p:cNvSpPr>
+          <p:nvPr>
+            <p:ph type="title"/>
+          </p:nvPr>
+        </p:nvSpPr>
+        <p:spPr/>
+        <p:txBody>
+          <a:bodyPr/>
+          <a:lstStyle/>
+          <a:p>
+            <a:r>
+              <a:rPr lang="pt-PT" dirty="0" smtClean="0">
+                <a:solidFill>
+                  <a:srgbClr val="0070C0"/>
+                </a:solidFill>
+              </a:rPr>
+              <a:t>Operador: PMX - </a:t>
+            </a:r>
+            <a:r>
+              <a:rPr lang="pt-PT" dirty="0" err="1" smtClean="0">
+                <a:solidFill>
+                  <a:srgbClr val="0070C0"/>
+                </a:solidFill>
+              </a:rPr>
+              <a:t>Crossover</a:t>
+            </a:r>
+            <a:endParaRPr lang="pt-PT" dirty="0"/>
+          </a:p>
+        </p:txBody>
+      </p:sp>
+      <p:sp>
+        <p:nvSpPr>
+          <p:cNvPr id="3" name="Marcador de Posição de Conteúdo 2"/>
+          <p:cNvSpPr>
+            <a:spLocks noGrp="1"/>
+          </p:cNvSpPr>
+          <p:nvPr>
+            <p:ph sz="quarter" idx="1"/>
+          </p:nvPr>
+        </p:nvSpPr>
+        <p:spPr/>
+        <p:txBody>
+          <a:bodyPr/>
+          <a:lstStyle/>
+          <a:p>
+            <a:endParaRPr lang="pt-PT" dirty="0" smtClean="0"/>
+          </a:p>
+          <a:p>
+            <a:pPr lvl="1"/>
+            <a:r>
+              <a:rPr lang="pt-PT" dirty="0" smtClean="0">
+                <a:solidFill>
+                  <a:schemeClr val="tx1"/>
+                </a:solidFill>
+              </a:rPr>
+              <a:t>Para o filho2:</a:t>
+            </a:r>
+          </a:p>
+          <a:p>
+            <a:pPr lvl="1"/>
+            <a:endParaRPr lang="pt-PT" dirty="0"/>
+          </a:p>
+        </p:txBody>
+      </p:sp>
+      <p:pic>
+        <p:nvPicPr>
+          <p:cNvPr id="26626" name="Picture 2"/>
+          <p:cNvPicPr>
+            <a:picLocks noChangeAspect="1" noChangeArrowheads="1"/>
+          </p:cNvPicPr>
           <p:nvPr/>
-        </p:nvSpPr>
+        </p:nvPicPr>
+        <p:blipFill>
+          <a:blip r:embed="rId2" cstate="print"/>
+          <a:srcRect/>
+          <a:stretch>
+            <a:fillRect/>
+          </a:stretch>
+        </p:blipFill>
         <p:spPr bwMode="auto">
           <a:xfrm>
-            <a:off x="6156176" y="4725144"/>
-            <a:ext cx="334962" cy="361950"/>
-          </a:xfrm>
-          <a:prstGeom prst="downArrow">
-            <a:avLst>
-              <a:gd name="adj1" fmla="val 50000"/>
-              <a:gd name="adj2" fmla="val 27014"/>
-            </a:avLst>
+            <a:off x="683568" y="2780928"/>
+            <a:ext cx="7753350" cy="3171825"/>
+          </a:xfrm>
+          <a:prstGeom prst="rect">
+            <a:avLst/>
           </a:prstGeom>
-          <a:solidFill>
-            <a:srgbClr val="4F81BD"/>
-          </a:solidFill>
-          <a:ln w="38100">
-            <a:solidFill>
-              <a:srgbClr val="F2F2F2"/>
-            </a:solidFill>
+          <a:noFill/>
+          <a:ln w="9525">
+            <a:noFill/>
             <a:miter lim="800000"/>
             <a:headEnd/>
             <a:tailEnd/>
           </a:ln>
-          <a:effectLst>
-            <a:outerShdw dist="28398" dir="3806097" algn="ctr" rotWithShape="0">
-              <a:srgbClr val="243F60">
-                <a:alpha val="50000"/>
-              </a:srgbClr>
-            </a:outerShdw>
-          </a:effectLst>
-        </p:spPr>
-        <p:txBody>
-          <a:bodyPr vert="eaVert" wrap="square" lIns="91440" tIns="45720" rIns="91440" bIns="45720" numCol="1" anchor="t" anchorCtr="0" compatLnSpc="1">
-            <a:prstTxWarp prst="textNoShape">
-              <a:avLst/>
-            </a:prstTxWarp>
-          </a:bodyPr>
-          <a:lstStyle/>
-          <a:p>
-            <a:endParaRPr lang="pt-PT"/>
-          </a:p>
-        </p:txBody>
-      </p:sp>
-      <p:sp>
-        <p:nvSpPr>
-          <p:cNvPr id="13318" name="AutoShape 6"/>
-          <p:cNvSpPr>
-            <a:spLocks noChangeArrowheads="1"/>
-          </p:cNvSpPr>
+        </p:spPr>
+      </p:pic>
+    </p:spTree>
+  </p:cSld>
+  <p:clrMapOvr>
+    <a:masterClrMapping/>
+  </p:clrMapOvr>
+</p:sld>
+</file>
+
+<file path=ppt/slides/slide19.xml><?xml version="1.0" encoding="utf-8"?>
+<p:sld xmlns:a="http://schemas.openxmlformats.org/drawingml/2006/main" xmlns:r="http://schemas.openxmlformats.org/officeDocument/2006/relationships" xmlns:p="http://schemas.openxmlformats.org/presentationml/2006/main">
+  <p:cSld>
+    <p:spTree>
+      <p:nvGrpSpPr>
+        <p:cNvPr id="1" name=""/>
+        <p:cNvGrpSpPr/>
+        <p:nvPr/>
+      </p:nvGrpSpPr>
+      <p:grpSpPr>
+        <a:xfrm>
+          <a:off x="0" y="0"/>
+          <a:ext cx="0" cy="0"/>
+          <a:chOff x="0" y="0"/>
+          <a:chExt cx="0" cy="0"/>
+        </a:xfrm>
+      </p:grpSpPr>
+      <p:sp>
+        <p:nvSpPr>
+          <p:cNvPr id="2" name="Título 1"/>
+          <p:cNvSpPr>
+            <a:spLocks noGrp="1"/>
+          </p:cNvSpPr>
+          <p:nvPr>
+            <p:ph type="title"/>
+          </p:nvPr>
+        </p:nvSpPr>
+        <p:spPr/>
+        <p:txBody>
+          <a:bodyPr/>
+          <a:lstStyle/>
+          <a:p>
+            <a:r>
+              <a:rPr lang="pt-PT" dirty="0" smtClean="0">
+                <a:solidFill>
+                  <a:srgbClr val="0070C0"/>
+                </a:solidFill>
+              </a:rPr>
+              <a:t>Operador: SUS - Minimização</a:t>
+            </a:r>
+            <a:endParaRPr lang="pt-PT" dirty="0"/>
+          </a:p>
+        </p:txBody>
+      </p:sp>
+      <p:sp>
+        <p:nvSpPr>
+          <p:cNvPr id="3" name="Marcador de Posição de Conteúdo 2"/>
+          <p:cNvSpPr>
+            <a:spLocks noGrp="1"/>
+          </p:cNvSpPr>
+          <p:nvPr>
+            <p:ph sz="quarter" idx="1"/>
+          </p:nvPr>
+        </p:nvSpPr>
+        <p:spPr/>
+        <p:txBody>
+          <a:bodyPr/>
+          <a:lstStyle/>
+          <a:p>
+            <a:r>
+              <a:rPr lang="pt-PT" dirty="0" smtClean="0"/>
+              <a:t>Problema: </a:t>
+            </a:r>
+          </a:p>
+          <a:p>
+            <a:pPr lvl="1"/>
+            <a:r>
+              <a:rPr lang="pt-PT" dirty="0" smtClean="0"/>
+              <a:t>O operador SUS seleciona o fitness mais alto, por isso é preciso adaptá-lo para passar a selecionar o mais baixo e poder assim utilizá-lo no caixeiro viajante.</a:t>
+            </a:r>
+          </a:p>
+          <a:p>
+            <a:endParaRPr lang="pt-PT" dirty="0" smtClean="0"/>
+          </a:p>
+          <a:p>
+            <a:r>
+              <a:rPr lang="pt-PT" dirty="0" smtClean="0"/>
+              <a:t>Esquema:</a:t>
+            </a:r>
+          </a:p>
+          <a:p>
+            <a:endParaRPr lang="pt-PT" dirty="0" smtClean="0"/>
+          </a:p>
+          <a:p>
+            <a:endParaRPr lang="pt-PT" dirty="0" smtClean="0"/>
+          </a:p>
+          <a:p>
+            <a:endParaRPr lang="pt-PT" dirty="0" smtClean="0"/>
+          </a:p>
+          <a:p>
+            <a:pPr lvl="1"/>
+            <a:r>
+              <a:rPr lang="pt-PT" dirty="0" smtClean="0"/>
+              <a:t>Max(População)=12</a:t>
+            </a:r>
+          </a:p>
+          <a:p>
+            <a:pPr lvl="1"/>
+            <a:r>
+              <a:rPr lang="pt-PT" dirty="0" smtClean="0"/>
+              <a:t>Min(População)=1</a:t>
+            </a:r>
+          </a:p>
+          <a:p>
+            <a:pPr lvl="1"/>
+            <a:endParaRPr lang="pt-PT" dirty="0"/>
+          </a:p>
+        </p:txBody>
+      </p:sp>
+      <p:pic>
+        <p:nvPicPr>
+          <p:cNvPr id="10244" name="Picture 4"/>
+          <p:cNvPicPr>
+            <a:picLocks noChangeAspect="1" noChangeArrowheads="1"/>
+          </p:cNvPicPr>
           <p:nvPr/>
-        </p:nvSpPr>
+        </p:nvPicPr>
+        <p:blipFill>
+          <a:blip r:embed="rId2" cstate="print"/>
+          <a:srcRect/>
+          <a:stretch>
+            <a:fillRect/>
+          </a:stretch>
+        </p:blipFill>
         <p:spPr bwMode="auto">
           <a:xfrm>
-            <a:off x="3707904" y="4725144"/>
-            <a:ext cx="334963" cy="361950"/>
-          </a:xfrm>
-          <a:prstGeom prst="downArrow">
-            <a:avLst>
-              <a:gd name="adj1" fmla="val 50000"/>
-              <a:gd name="adj2" fmla="val 27014"/>
-            </a:avLst>
+            <a:off x="755576" y="3789040"/>
+            <a:ext cx="7056784" cy="1368152"/>
+          </a:xfrm>
+          <a:prstGeom prst="rect">
+            <a:avLst/>
           </a:prstGeom>
-          <a:solidFill>
-            <a:srgbClr val="9BBB59"/>
-          </a:solidFill>
-          <a:ln w="38100">
-            <a:solidFill>
-              <a:srgbClr val="F2F2F2"/>
-            </a:solidFill>
+          <a:noFill/>
+          <a:ln w="9525">
+            <a:noFill/>
             <a:miter lim="800000"/>
             <a:headEnd/>
             <a:tailEnd/>
           </a:ln>
-          <a:effectLst>
-            <a:outerShdw dist="28398" dir="3806097" algn="ctr" rotWithShape="0">
-              <a:srgbClr val="4E6128">
-                <a:alpha val="50000"/>
-              </a:srgbClr>
-            </a:outerShdw>
-          </a:effectLst>
-        </p:spPr>
-        <p:txBody>
-          <a:bodyPr vert="eaVert" wrap="square" lIns="91440" tIns="45720" rIns="91440" bIns="45720" numCol="1" anchor="t" anchorCtr="0" compatLnSpc="1">
-            <a:prstTxWarp prst="textNoShape">
-              <a:avLst/>
-            </a:prstTxWarp>
-          </a:bodyPr>
-          <a:lstStyle/>
-          <a:p>
-            <a:endParaRPr lang="pt-PT"/>
-          </a:p>
-        </p:txBody>
-      </p:sp>
+        </p:spPr>
+      </p:pic>
     </p:spTree>
   </p:cSld>
   <p:clrMapOvr>
@@ -5579,6 +5995,1014 @@
       </p:par>
     </p:tnLst>
   </p:timing>
+</p:sld>
+</file>
+
+<file path=ppt/slides/slide20.xml><?xml version="1.0" encoding="utf-8"?>
+<p:sld xmlns:a="http://schemas.openxmlformats.org/drawingml/2006/main" xmlns:r="http://schemas.openxmlformats.org/officeDocument/2006/relationships" xmlns:p="http://schemas.openxmlformats.org/presentationml/2006/main">
+  <p:cSld>
+    <p:spTree>
+      <p:nvGrpSpPr>
+        <p:cNvPr id="1" name=""/>
+        <p:cNvGrpSpPr/>
+        <p:nvPr/>
+      </p:nvGrpSpPr>
+      <p:grpSpPr>
+        <a:xfrm>
+          <a:off x="0" y="0"/>
+          <a:ext cx="0" cy="0"/>
+          <a:chOff x="0" y="0"/>
+          <a:chExt cx="0" cy="0"/>
+        </a:xfrm>
+      </p:grpSpPr>
+      <p:sp>
+        <p:nvSpPr>
+          <p:cNvPr id="2" name="Título 1"/>
+          <p:cNvSpPr>
+            <a:spLocks noGrp="1"/>
+          </p:cNvSpPr>
+          <p:nvPr>
+            <p:ph type="title"/>
+          </p:nvPr>
+        </p:nvSpPr>
+        <p:spPr/>
+        <p:txBody>
+          <a:bodyPr/>
+          <a:lstStyle/>
+          <a:p>
+            <a:r>
+              <a:rPr lang="pt-PT" dirty="0" smtClean="0">
+                <a:solidFill>
+                  <a:srgbClr val="0070C0"/>
+                </a:solidFill>
+              </a:rPr>
+              <a:t>Operador: SUS - Minimização</a:t>
+            </a:r>
+            <a:endParaRPr lang="pt-PT" dirty="0"/>
+          </a:p>
+        </p:txBody>
+      </p:sp>
+      <p:sp>
+        <p:nvSpPr>
+          <p:cNvPr id="3" name="Marcador de Posição de Conteúdo 2"/>
+          <p:cNvSpPr>
+            <a:spLocks noGrp="1"/>
+          </p:cNvSpPr>
+          <p:nvPr>
+            <p:ph sz="quarter" idx="1"/>
+          </p:nvPr>
+        </p:nvSpPr>
+        <p:spPr/>
+        <p:txBody>
+          <a:bodyPr/>
+          <a:lstStyle/>
+          <a:p>
+            <a:r>
+              <a:rPr lang="pt-PT" dirty="0" smtClean="0"/>
+              <a:t>PseudoCodigo : Calcular novo fitness</a:t>
+            </a:r>
+          </a:p>
+          <a:p>
+            <a:pPr lvl="1"/>
+            <a:endParaRPr lang="pt-PT" dirty="0"/>
+          </a:p>
+        </p:txBody>
+      </p:sp>
+      <p:pic>
+        <p:nvPicPr>
+          <p:cNvPr id="21507" name="Picture 3"/>
+          <p:cNvPicPr>
+            <a:picLocks noChangeAspect="1" noChangeArrowheads="1"/>
+          </p:cNvPicPr>
+          <p:nvPr/>
+        </p:nvPicPr>
+        <p:blipFill>
+          <a:blip r:embed="rId2" cstate="print"/>
+          <a:srcRect/>
+          <a:stretch>
+            <a:fillRect/>
+          </a:stretch>
+        </p:blipFill>
+        <p:spPr bwMode="auto">
+          <a:xfrm>
+            <a:off x="683568" y="1700808"/>
+            <a:ext cx="7138208" cy="3528392"/>
+          </a:xfrm>
+          <a:prstGeom prst="rect">
+            <a:avLst/>
+          </a:prstGeom>
+          <a:noFill/>
+          <a:ln w="9525">
+            <a:noFill/>
+            <a:miter lim="800000"/>
+            <a:headEnd/>
+            <a:tailEnd/>
+          </a:ln>
+        </p:spPr>
+      </p:pic>
+    </p:spTree>
+  </p:cSld>
+  <p:clrMapOvr>
+    <a:masterClrMapping/>
+  </p:clrMapOvr>
+  <p:timing>
+    <p:tnLst>
+      <p:par>
+        <p:cTn id="1" dur="indefinite" restart="never" nodeType="tmRoot"/>
+      </p:par>
+    </p:tnLst>
+  </p:timing>
+</p:sld>
+</file>
+
+<file path=ppt/slides/slide21.xml><?xml version="1.0" encoding="utf-8"?>
+<p:sld xmlns:a="http://schemas.openxmlformats.org/drawingml/2006/main" xmlns:r="http://schemas.openxmlformats.org/officeDocument/2006/relationships" xmlns:p="http://schemas.openxmlformats.org/presentationml/2006/main">
+  <p:cSld>
+    <p:spTree>
+      <p:nvGrpSpPr>
+        <p:cNvPr id="1" name=""/>
+        <p:cNvGrpSpPr/>
+        <p:nvPr/>
+      </p:nvGrpSpPr>
+      <p:grpSpPr>
+        <a:xfrm>
+          <a:off x="0" y="0"/>
+          <a:ext cx="0" cy="0"/>
+          <a:chOff x="0" y="0"/>
+          <a:chExt cx="0" cy="0"/>
+        </a:xfrm>
+      </p:grpSpPr>
+      <p:sp>
+        <p:nvSpPr>
+          <p:cNvPr id="2" name="Título 1"/>
+          <p:cNvSpPr>
+            <a:spLocks noGrp="1"/>
+          </p:cNvSpPr>
+          <p:nvPr>
+            <p:ph type="title"/>
+          </p:nvPr>
+        </p:nvSpPr>
+        <p:spPr/>
+        <p:txBody>
+          <a:bodyPr/>
+          <a:lstStyle/>
+          <a:p>
+            <a:r>
+              <a:rPr lang="pt-PT" dirty="0" smtClean="0">
+                <a:solidFill>
+                  <a:srgbClr val="0070C0"/>
+                </a:solidFill>
+              </a:rPr>
+              <a:t>Operador: SUS - Minimização</a:t>
+            </a:r>
+            <a:endParaRPr lang="pt-PT" dirty="0"/>
+          </a:p>
+        </p:txBody>
+      </p:sp>
+      <p:sp>
+        <p:nvSpPr>
+          <p:cNvPr id="3" name="Marcador de Posição de Conteúdo 2"/>
+          <p:cNvSpPr>
+            <a:spLocks noGrp="1"/>
+          </p:cNvSpPr>
+          <p:nvPr>
+            <p:ph sz="quarter" idx="1"/>
+          </p:nvPr>
+        </p:nvSpPr>
+        <p:spPr/>
+        <p:txBody>
+          <a:bodyPr/>
+          <a:lstStyle/>
+          <a:p>
+            <a:r>
+              <a:rPr lang="pt-PT" dirty="0" smtClean="0"/>
+              <a:t>Novos valores de fitness:</a:t>
+            </a:r>
+          </a:p>
+          <a:p>
+            <a:endParaRPr lang="pt-PT" dirty="0" smtClean="0"/>
+          </a:p>
+          <a:p>
+            <a:endParaRPr lang="pt-PT" dirty="0" smtClean="0"/>
+          </a:p>
+          <a:p>
+            <a:pPr lvl="1"/>
+            <a:endParaRPr lang="pt-PT" dirty="0" smtClean="0"/>
+          </a:p>
+          <a:p>
+            <a:pPr lvl="1"/>
+            <a:r>
+              <a:rPr lang="en-US" sz="2500" dirty="0" smtClean="0"/>
+              <a:t>Novo Fitness = (12 + 1) - Fitness</a:t>
+            </a:r>
+            <a:endParaRPr lang="pt-PT" sz="1700" dirty="0" smtClean="0"/>
+          </a:p>
+          <a:p>
+            <a:pPr lvl="1"/>
+            <a:r>
+              <a:rPr lang="en-US" sz="2500" dirty="0" smtClean="0"/>
+              <a:t>Novo Fitness A = 13 – 10 = 3</a:t>
+            </a:r>
+          </a:p>
+          <a:p>
+            <a:pPr lvl="1"/>
+            <a:endParaRPr lang="en-US" sz="2500" dirty="0" smtClean="0"/>
+          </a:p>
+          <a:p>
+            <a:r>
+              <a:rPr lang="pt-PT" dirty="0" smtClean="0"/>
+              <a:t>Fazendo esta conversão do fitness, o fitness com valor mais alto passa a ter o valor mais baixo, o que torna possível a utilização do operador SUS.</a:t>
+            </a:r>
+          </a:p>
+          <a:p>
+            <a:pPr lvl="1"/>
+            <a:endParaRPr lang="pt-PT" dirty="0" smtClean="0"/>
+          </a:p>
+          <a:p>
+            <a:pPr lvl="1"/>
+            <a:endParaRPr lang="pt-PT" dirty="0"/>
+          </a:p>
+        </p:txBody>
+      </p:sp>
+      <p:pic>
+        <p:nvPicPr>
+          <p:cNvPr id="12292" name="Picture 4"/>
+          <p:cNvPicPr>
+            <a:picLocks noChangeAspect="1" noChangeArrowheads="1"/>
+          </p:cNvPicPr>
+          <p:nvPr/>
+        </p:nvPicPr>
+        <p:blipFill>
+          <a:blip r:embed="rId2" cstate="print"/>
+          <a:srcRect/>
+          <a:stretch>
+            <a:fillRect/>
+          </a:stretch>
+        </p:blipFill>
+        <p:spPr bwMode="auto">
+          <a:xfrm>
+            <a:off x="1547664" y="1772816"/>
+            <a:ext cx="5467350" cy="1009650"/>
+          </a:xfrm>
+          <a:prstGeom prst="rect">
+            <a:avLst/>
+          </a:prstGeom>
+          <a:noFill/>
+          <a:ln w="9525">
+            <a:noFill/>
+            <a:miter lim="800000"/>
+            <a:headEnd/>
+            <a:tailEnd/>
+          </a:ln>
+        </p:spPr>
+      </p:pic>
+    </p:spTree>
+  </p:cSld>
+  <p:clrMapOvr>
+    <a:masterClrMapping/>
+  </p:clrMapOvr>
+  <p:timing>
+    <p:tnLst>
+      <p:par>
+        <p:cTn id="1" dur="indefinite" restart="never" nodeType="tmRoot"/>
+      </p:par>
+    </p:tnLst>
+  </p:timing>
+</p:sld>
+</file>
+
+<file path=ppt/slides/slide22.xml><?xml version="1.0" encoding="utf-8"?>
+<p:sld xmlns:a="http://schemas.openxmlformats.org/drawingml/2006/main" xmlns:r="http://schemas.openxmlformats.org/officeDocument/2006/relationships" xmlns:p="http://schemas.openxmlformats.org/presentationml/2006/main">
+  <p:cSld>
+    <p:spTree>
+      <p:nvGrpSpPr>
+        <p:cNvPr id="1" name=""/>
+        <p:cNvGrpSpPr/>
+        <p:nvPr/>
+      </p:nvGrpSpPr>
+      <p:grpSpPr>
+        <a:xfrm>
+          <a:off x="0" y="0"/>
+          <a:ext cx="0" cy="0"/>
+          <a:chOff x="0" y="0"/>
+          <a:chExt cx="0" cy="0"/>
+        </a:xfrm>
+      </p:grpSpPr>
+      <p:sp>
+        <p:nvSpPr>
+          <p:cNvPr id="2" name="Título 1"/>
+          <p:cNvSpPr>
+            <a:spLocks noGrp="1"/>
+          </p:cNvSpPr>
+          <p:nvPr>
+            <p:ph type="title"/>
+          </p:nvPr>
+        </p:nvSpPr>
+        <p:spPr/>
+        <p:txBody>
+          <a:bodyPr/>
+          <a:lstStyle/>
+          <a:p>
+            <a:r>
+              <a:rPr lang="pt-PT" dirty="0" smtClean="0">
+                <a:solidFill>
+                  <a:srgbClr val="0070C0"/>
+                </a:solidFill>
+              </a:rPr>
+              <a:t>Operador: Swap Genes - Mutação</a:t>
+            </a:r>
+            <a:endParaRPr lang="pt-PT" dirty="0"/>
+          </a:p>
+        </p:txBody>
+      </p:sp>
+      <p:sp>
+        <p:nvSpPr>
+          <p:cNvPr id="3" name="Marcador de Posição de Conteúdo 2"/>
+          <p:cNvSpPr>
+            <a:spLocks noGrp="1"/>
+          </p:cNvSpPr>
+          <p:nvPr>
+            <p:ph sz="quarter" idx="1"/>
+          </p:nvPr>
+        </p:nvSpPr>
+        <p:spPr/>
+        <p:txBody>
+          <a:bodyPr/>
+          <a:lstStyle/>
+          <a:p>
+            <a:r>
+              <a:rPr lang="pt-PT" dirty="0" smtClean="0"/>
+              <a:t>Descrição:</a:t>
+            </a:r>
+          </a:p>
+          <a:p>
+            <a:pPr lvl="1"/>
+            <a:r>
+              <a:rPr lang="pt-PT" dirty="0" smtClean="0"/>
+              <a:t>Escolher dois alelos aleatórios de um indivíduo, e trocá-los de sítio.</a:t>
+            </a:r>
+          </a:p>
+          <a:p>
+            <a:r>
+              <a:rPr lang="pt-PT" dirty="0" smtClean="0"/>
+              <a:t>Esquema:</a:t>
+            </a:r>
+          </a:p>
+          <a:p>
+            <a:endParaRPr lang="pt-PT" dirty="0" smtClean="0"/>
+          </a:p>
+        </p:txBody>
+      </p:sp>
+      <p:pic>
+        <p:nvPicPr>
+          <p:cNvPr id="13314" name="Picture 2"/>
+          <p:cNvPicPr>
+            <a:picLocks noChangeAspect="1" noChangeArrowheads="1"/>
+          </p:cNvPicPr>
+          <p:nvPr/>
+        </p:nvPicPr>
+        <p:blipFill>
+          <a:blip r:embed="rId2" cstate="print"/>
+          <a:srcRect/>
+          <a:stretch>
+            <a:fillRect/>
+          </a:stretch>
+        </p:blipFill>
+        <p:spPr bwMode="auto">
+          <a:xfrm>
+            <a:off x="2123728" y="2996952"/>
+            <a:ext cx="4680520" cy="3312368"/>
+          </a:xfrm>
+          <a:prstGeom prst="rect">
+            <a:avLst/>
+          </a:prstGeom>
+          <a:noFill/>
+          <a:ln w="9525">
+            <a:noFill/>
+            <a:miter lim="800000"/>
+            <a:headEnd/>
+            <a:tailEnd/>
+          </a:ln>
+        </p:spPr>
+      </p:pic>
+      <p:sp>
+        <p:nvSpPr>
+          <p:cNvPr id="13315" name="AutoShape 3"/>
+          <p:cNvSpPr>
+            <a:spLocks noChangeArrowheads="1"/>
+          </p:cNvSpPr>
+          <p:nvPr/>
+        </p:nvSpPr>
+        <p:spPr bwMode="auto">
+          <a:xfrm>
+            <a:off x="3635896" y="4149080"/>
+            <a:ext cx="361950" cy="257175"/>
+          </a:xfrm>
+          <a:prstGeom prst="upArrow">
+            <a:avLst>
+              <a:gd name="adj1" fmla="val 50000"/>
+              <a:gd name="adj2" fmla="val 25000"/>
+            </a:avLst>
+          </a:prstGeom>
+          <a:solidFill>
+            <a:srgbClr val="4F81BD"/>
+          </a:solidFill>
+          <a:ln w="38100">
+            <a:solidFill>
+              <a:srgbClr val="F2F2F2"/>
+            </a:solidFill>
+            <a:miter lim="800000"/>
+            <a:headEnd/>
+            <a:tailEnd/>
+          </a:ln>
+          <a:effectLst>
+            <a:outerShdw dist="28398" dir="3806097" algn="ctr" rotWithShape="0">
+              <a:srgbClr val="243F60">
+                <a:alpha val="50000"/>
+              </a:srgbClr>
+            </a:outerShdw>
+          </a:effectLst>
+        </p:spPr>
+        <p:txBody>
+          <a:bodyPr vert="eaVert" wrap="square" lIns="91440" tIns="45720" rIns="91440" bIns="45720" numCol="1" anchor="t" anchorCtr="0" compatLnSpc="1">
+            <a:prstTxWarp prst="textNoShape">
+              <a:avLst/>
+            </a:prstTxWarp>
+          </a:bodyPr>
+          <a:lstStyle/>
+          <a:p>
+            <a:endParaRPr lang="pt-PT"/>
+          </a:p>
+        </p:txBody>
+      </p:sp>
+      <p:sp>
+        <p:nvSpPr>
+          <p:cNvPr id="13316" name="AutoShape 4"/>
+          <p:cNvSpPr>
+            <a:spLocks noChangeArrowheads="1"/>
+          </p:cNvSpPr>
+          <p:nvPr/>
+        </p:nvSpPr>
+        <p:spPr bwMode="auto">
+          <a:xfrm>
+            <a:off x="6156176" y="4221088"/>
+            <a:ext cx="361950" cy="257175"/>
+          </a:xfrm>
+          <a:prstGeom prst="upArrow">
+            <a:avLst>
+              <a:gd name="adj1" fmla="val 50000"/>
+              <a:gd name="adj2" fmla="val 25000"/>
+            </a:avLst>
+          </a:prstGeom>
+          <a:solidFill>
+            <a:srgbClr val="9BBB59"/>
+          </a:solidFill>
+          <a:ln w="38100">
+            <a:solidFill>
+              <a:srgbClr val="F2F2F2"/>
+            </a:solidFill>
+            <a:miter lim="800000"/>
+            <a:headEnd/>
+            <a:tailEnd/>
+          </a:ln>
+          <a:effectLst>
+            <a:outerShdw dist="28398" dir="3806097" algn="ctr" rotWithShape="0">
+              <a:srgbClr val="4E6128">
+                <a:alpha val="50000"/>
+              </a:srgbClr>
+            </a:outerShdw>
+          </a:effectLst>
+        </p:spPr>
+        <p:txBody>
+          <a:bodyPr vert="eaVert" wrap="square" lIns="91440" tIns="45720" rIns="91440" bIns="45720" numCol="1" anchor="t" anchorCtr="0" compatLnSpc="1">
+            <a:prstTxWarp prst="textNoShape">
+              <a:avLst/>
+            </a:prstTxWarp>
+          </a:bodyPr>
+          <a:lstStyle/>
+          <a:p>
+            <a:endParaRPr lang="pt-PT"/>
+          </a:p>
+        </p:txBody>
+      </p:sp>
+      <p:sp>
+        <p:nvSpPr>
+          <p:cNvPr id="13317" name="AutoShape 5"/>
+          <p:cNvSpPr>
+            <a:spLocks noChangeArrowheads="1"/>
+          </p:cNvSpPr>
+          <p:nvPr/>
+        </p:nvSpPr>
+        <p:spPr bwMode="auto">
+          <a:xfrm>
+            <a:off x="6156176" y="4725144"/>
+            <a:ext cx="334962" cy="361950"/>
+          </a:xfrm>
+          <a:prstGeom prst="downArrow">
+            <a:avLst>
+              <a:gd name="adj1" fmla="val 50000"/>
+              <a:gd name="adj2" fmla="val 27014"/>
+            </a:avLst>
+          </a:prstGeom>
+          <a:solidFill>
+            <a:srgbClr val="4F81BD"/>
+          </a:solidFill>
+          <a:ln w="38100">
+            <a:solidFill>
+              <a:srgbClr val="F2F2F2"/>
+            </a:solidFill>
+            <a:miter lim="800000"/>
+            <a:headEnd/>
+            <a:tailEnd/>
+          </a:ln>
+          <a:effectLst>
+            <a:outerShdw dist="28398" dir="3806097" algn="ctr" rotWithShape="0">
+              <a:srgbClr val="243F60">
+                <a:alpha val="50000"/>
+              </a:srgbClr>
+            </a:outerShdw>
+          </a:effectLst>
+        </p:spPr>
+        <p:txBody>
+          <a:bodyPr vert="eaVert" wrap="square" lIns="91440" tIns="45720" rIns="91440" bIns="45720" numCol="1" anchor="t" anchorCtr="0" compatLnSpc="1">
+            <a:prstTxWarp prst="textNoShape">
+              <a:avLst/>
+            </a:prstTxWarp>
+          </a:bodyPr>
+          <a:lstStyle/>
+          <a:p>
+            <a:endParaRPr lang="pt-PT"/>
+          </a:p>
+        </p:txBody>
+      </p:sp>
+      <p:sp>
+        <p:nvSpPr>
+          <p:cNvPr id="13318" name="AutoShape 6"/>
+          <p:cNvSpPr>
+            <a:spLocks noChangeArrowheads="1"/>
+          </p:cNvSpPr>
+          <p:nvPr/>
+        </p:nvSpPr>
+        <p:spPr bwMode="auto">
+          <a:xfrm>
+            <a:off x="3707904" y="4725144"/>
+            <a:ext cx="334963" cy="361950"/>
+          </a:xfrm>
+          <a:prstGeom prst="downArrow">
+            <a:avLst>
+              <a:gd name="adj1" fmla="val 50000"/>
+              <a:gd name="adj2" fmla="val 27014"/>
+            </a:avLst>
+          </a:prstGeom>
+          <a:solidFill>
+            <a:srgbClr val="9BBB59"/>
+          </a:solidFill>
+          <a:ln w="38100">
+            <a:solidFill>
+              <a:srgbClr val="F2F2F2"/>
+            </a:solidFill>
+            <a:miter lim="800000"/>
+            <a:headEnd/>
+            <a:tailEnd/>
+          </a:ln>
+          <a:effectLst>
+            <a:outerShdw dist="28398" dir="3806097" algn="ctr" rotWithShape="0">
+              <a:srgbClr val="4E6128">
+                <a:alpha val="50000"/>
+              </a:srgbClr>
+            </a:outerShdw>
+          </a:effectLst>
+        </p:spPr>
+        <p:txBody>
+          <a:bodyPr vert="eaVert" wrap="square" lIns="91440" tIns="45720" rIns="91440" bIns="45720" numCol="1" anchor="t" anchorCtr="0" compatLnSpc="1">
+            <a:prstTxWarp prst="textNoShape">
+              <a:avLst/>
+            </a:prstTxWarp>
+          </a:bodyPr>
+          <a:lstStyle/>
+          <a:p>
+            <a:endParaRPr lang="pt-PT"/>
+          </a:p>
+        </p:txBody>
+      </p:sp>
+    </p:spTree>
+  </p:cSld>
+  <p:clrMapOvr>
+    <a:masterClrMapping/>
+  </p:clrMapOvr>
+  <p:timing>
+    <p:tnLst>
+      <p:par>
+        <p:cTn id="1" dur="indefinite" restart="never" nodeType="tmRoot"/>
+      </p:par>
+    </p:tnLst>
+  </p:timing>
+</p:sld>
+</file>
+
+<file path=ppt/slides/slide23.xml><?xml version="1.0" encoding="utf-8"?>
+<p:sld xmlns:a="http://schemas.openxmlformats.org/drawingml/2006/main" xmlns:r="http://schemas.openxmlformats.org/officeDocument/2006/relationships" xmlns:p="http://schemas.openxmlformats.org/presentationml/2006/main">
+  <p:cSld>
+    <p:spTree>
+      <p:nvGrpSpPr>
+        <p:cNvPr id="1" name=""/>
+        <p:cNvGrpSpPr/>
+        <p:nvPr/>
+      </p:nvGrpSpPr>
+      <p:grpSpPr>
+        <a:xfrm>
+          <a:off x="0" y="0"/>
+          <a:ext cx="0" cy="0"/>
+          <a:chOff x="0" y="0"/>
+          <a:chExt cx="0" cy="0"/>
+        </a:xfrm>
+      </p:grpSpPr>
+      <p:sp>
+        <p:nvSpPr>
+          <p:cNvPr id="2" name="Título 1"/>
+          <p:cNvSpPr>
+            <a:spLocks noGrp="1"/>
+          </p:cNvSpPr>
+          <p:nvPr>
+            <p:ph type="title"/>
+          </p:nvPr>
+        </p:nvSpPr>
+        <p:spPr/>
+        <p:txBody>
+          <a:bodyPr/>
+          <a:lstStyle/>
+          <a:p>
+            <a:r>
+              <a:rPr lang="pt-PT" dirty="0" smtClean="0">
+                <a:solidFill>
+                  <a:srgbClr val="0070C0"/>
+                </a:solidFill>
+              </a:rPr>
+              <a:t>Operador: </a:t>
+            </a:r>
+            <a:r>
+              <a:rPr lang="pt-PT" dirty="0" err="1" smtClean="0">
+                <a:solidFill>
+                  <a:srgbClr val="0070C0"/>
+                </a:solidFill>
+              </a:rPr>
+              <a:t>Inversion</a:t>
+            </a:r>
+            <a:r>
+              <a:rPr lang="pt-PT" dirty="0" smtClean="0">
+                <a:solidFill>
+                  <a:srgbClr val="0070C0"/>
+                </a:solidFill>
+              </a:rPr>
+              <a:t> - Mutação</a:t>
+            </a:r>
+            <a:endParaRPr lang="pt-PT" dirty="0"/>
+          </a:p>
+        </p:txBody>
+      </p:sp>
+      <p:sp>
+        <p:nvSpPr>
+          <p:cNvPr id="3" name="Marcador de Posição de Conteúdo 2"/>
+          <p:cNvSpPr>
+            <a:spLocks noGrp="1"/>
+          </p:cNvSpPr>
+          <p:nvPr>
+            <p:ph sz="quarter" idx="1"/>
+          </p:nvPr>
+        </p:nvSpPr>
+        <p:spPr/>
+        <p:txBody>
+          <a:bodyPr/>
+          <a:lstStyle/>
+          <a:p>
+            <a:r>
+              <a:rPr lang="pt-PT" dirty="0" smtClean="0"/>
+              <a:t>Descrição: São gerados 2 pontos de corte aleatórios, e os genes entre os cortes são invertidos na sua ordem, e os restantes mantêm-se.</a:t>
+            </a:r>
+          </a:p>
+          <a:p>
+            <a:endParaRPr lang="pt-PT" dirty="0" smtClean="0"/>
+          </a:p>
+          <a:p>
+            <a:r>
+              <a:rPr lang="pt-PT" dirty="0" smtClean="0"/>
+              <a:t>Passo 1: Gerar 2 pontos aleatórios;</a:t>
+            </a:r>
+          </a:p>
+          <a:p>
+            <a:endParaRPr lang="pt-PT" dirty="0"/>
+          </a:p>
+        </p:txBody>
+      </p:sp>
+      <p:pic>
+        <p:nvPicPr>
+          <p:cNvPr id="27653" name="Picture 5"/>
+          <p:cNvPicPr>
+            <a:picLocks noChangeAspect="1" noChangeArrowheads="1"/>
+          </p:cNvPicPr>
+          <p:nvPr/>
+        </p:nvPicPr>
+        <p:blipFill>
+          <a:blip r:embed="rId2" cstate="print"/>
+          <a:srcRect/>
+          <a:stretch>
+            <a:fillRect/>
+          </a:stretch>
+        </p:blipFill>
+        <p:spPr bwMode="auto">
+          <a:xfrm>
+            <a:off x="899592" y="3789040"/>
+            <a:ext cx="7267575" cy="828675"/>
+          </a:xfrm>
+          <a:prstGeom prst="rect">
+            <a:avLst/>
+          </a:prstGeom>
+          <a:noFill/>
+          <a:ln w="9525">
+            <a:noFill/>
+            <a:miter lim="800000"/>
+            <a:headEnd/>
+            <a:tailEnd/>
+          </a:ln>
+        </p:spPr>
+      </p:pic>
+    </p:spTree>
+  </p:cSld>
+  <p:clrMapOvr>
+    <a:masterClrMapping/>
+  </p:clrMapOvr>
+</p:sld>
+</file>
+
+<file path=ppt/slides/slide24.xml><?xml version="1.0" encoding="utf-8"?>
+<p:sld xmlns:a="http://schemas.openxmlformats.org/drawingml/2006/main" xmlns:r="http://schemas.openxmlformats.org/officeDocument/2006/relationships" xmlns:p="http://schemas.openxmlformats.org/presentationml/2006/main">
+  <p:cSld>
+    <p:spTree>
+      <p:nvGrpSpPr>
+        <p:cNvPr id="1" name=""/>
+        <p:cNvGrpSpPr/>
+        <p:nvPr/>
+      </p:nvGrpSpPr>
+      <p:grpSpPr>
+        <a:xfrm>
+          <a:off x="0" y="0"/>
+          <a:ext cx="0" cy="0"/>
+          <a:chOff x="0" y="0"/>
+          <a:chExt cx="0" cy="0"/>
+        </a:xfrm>
+      </p:grpSpPr>
+      <p:sp>
+        <p:nvSpPr>
+          <p:cNvPr id="2" name="Título 1"/>
+          <p:cNvSpPr>
+            <a:spLocks noGrp="1"/>
+          </p:cNvSpPr>
+          <p:nvPr>
+            <p:ph type="title"/>
+          </p:nvPr>
+        </p:nvSpPr>
+        <p:spPr/>
+        <p:txBody>
+          <a:bodyPr/>
+          <a:lstStyle/>
+          <a:p>
+            <a:r>
+              <a:rPr lang="pt-PT" dirty="0" smtClean="0">
+                <a:solidFill>
+                  <a:srgbClr val="0070C0"/>
+                </a:solidFill>
+              </a:rPr>
+              <a:t>Operador: </a:t>
+            </a:r>
+            <a:r>
+              <a:rPr lang="pt-PT" dirty="0" err="1" smtClean="0">
+                <a:solidFill>
+                  <a:srgbClr val="0070C0"/>
+                </a:solidFill>
+              </a:rPr>
+              <a:t>Inversion</a:t>
+            </a:r>
+            <a:r>
+              <a:rPr lang="pt-PT" dirty="0" smtClean="0">
+                <a:solidFill>
+                  <a:srgbClr val="0070C0"/>
+                </a:solidFill>
+              </a:rPr>
+              <a:t> - Mutação</a:t>
+            </a:r>
+            <a:endParaRPr lang="pt-PT" dirty="0"/>
+          </a:p>
+        </p:txBody>
+      </p:sp>
+      <p:sp>
+        <p:nvSpPr>
+          <p:cNvPr id="3" name="Marcador de Posição de Conteúdo 2"/>
+          <p:cNvSpPr>
+            <a:spLocks noGrp="1"/>
+          </p:cNvSpPr>
+          <p:nvPr>
+            <p:ph sz="quarter" idx="1"/>
+          </p:nvPr>
+        </p:nvSpPr>
+        <p:spPr/>
+        <p:txBody>
+          <a:bodyPr/>
+          <a:lstStyle/>
+          <a:p>
+            <a:endParaRPr lang="pt-PT" dirty="0" smtClean="0"/>
+          </a:p>
+          <a:p>
+            <a:endParaRPr lang="pt-PT" dirty="0" smtClean="0"/>
+          </a:p>
+          <a:p>
+            <a:pPr>
+              <a:buNone/>
+            </a:pPr>
+            <a:endParaRPr lang="pt-PT" dirty="0" smtClean="0"/>
+          </a:p>
+          <a:p>
+            <a:r>
+              <a:rPr lang="pt-PT" dirty="0" smtClean="0"/>
+              <a:t>Passo 2: Os genes dentro dos pontos de corte são invertidos;</a:t>
+            </a:r>
+            <a:endParaRPr lang="pt-PT" dirty="0"/>
+          </a:p>
+        </p:txBody>
+      </p:sp>
+      <p:pic>
+        <p:nvPicPr>
+          <p:cNvPr id="28677" name="Picture 5"/>
+          <p:cNvPicPr>
+            <a:picLocks noChangeAspect="1" noChangeArrowheads="1"/>
+          </p:cNvPicPr>
+          <p:nvPr/>
+        </p:nvPicPr>
+        <p:blipFill>
+          <a:blip r:embed="rId2" cstate="print"/>
+          <a:srcRect/>
+          <a:stretch>
+            <a:fillRect/>
+          </a:stretch>
+        </p:blipFill>
+        <p:spPr bwMode="auto">
+          <a:xfrm>
+            <a:off x="899592" y="3645024"/>
+            <a:ext cx="7267575" cy="1047750"/>
+          </a:xfrm>
+          <a:prstGeom prst="rect">
+            <a:avLst/>
+          </a:prstGeom>
+          <a:noFill/>
+          <a:ln w="9525">
+            <a:noFill/>
+            <a:miter lim="800000"/>
+            <a:headEnd/>
+            <a:tailEnd/>
+          </a:ln>
+        </p:spPr>
+      </p:pic>
+    </p:spTree>
+  </p:cSld>
+  <p:clrMapOvr>
+    <a:masterClrMapping/>
+  </p:clrMapOvr>
+</p:sld>
+</file>
+
+<file path=ppt/slides/slide25.xml><?xml version="1.0" encoding="utf-8"?>
+<p:sld xmlns:a="http://schemas.openxmlformats.org/drawingml/2006/main" xmlns:r="http://schemas.openxmlformats.org/officeDocument/2006/relationships" xmlns:p="http://schemas.openxmlformats.org/presentationml/2006/main">
+  <p:cSld>
+    <p:spTree>
+      <p:nvGrpSpPr>
+        <p:cNvPr id="1" name=""/>
+        <p:cNvGrpSpPr/>
+        <p:nvPr/>
+      </p:nvGrpSpPr>
+      <p:grpSpPr>
+        <a:xfrm>
+          <a:off x="0" y="0"/>
+          <a:ext cx="0" cy="0"/>
+          <a:chOff x="0" y="0"/>
+          <a:chExt cx="0" cy="0"/>
+        </a:xfrm>
+      </p:grpSpPr>
+      <p:sp>
+        <p:nvSpPr>
+          <p:cNvPr id="2" name="Título 1"/>
+          <p:cNvSpPr>
+            <a:spLocks noGrp="1"/>
+          </p:cNvSpPr>
+          <p:nvPr>
+            <p:ph type="title"/>
+          </p:nvPr>
+        </p:nvSpPr>
+        <p:spPr/>
+        <p:txBody>
+          <a:bodyPr/>
+          <a:lstStyle/>
+          <a:p>
+            <a:r>
+              <a:rPr lang="pt-PT" dirty="0" smtClean="0">
+                <a:solidFill>
+                  <a:srgbClr val="0070C0"/>
+                </a:solidFill>
+              </a:rPr>
+              <a:t>Operador: </a:t>
+            </a:r>
+            <a:r>
+              <a:rPr lang="pt-PT" dirty="0" err="1" smtClean="0">
+                <a:solidFill>
+                  <a:srgbClr val="0070C0"/>
+                </a:solidFill>
+              </a:rPr>
+              <a:t>Inversion</a:t>
+            </a:r>
+            <a:r>
+              <a:rPr lang="pt-PT" dirty="0" smtClean="0">
+                <a:solidFill>
+                  <a:srgbClr val="0070C0"/>
+                </a:solidFill>
+              </a:rPr>
+              <a:t> - Mutação</a:t>
+            </a:r>
+            <a:endParaRPr lang="pt-PT" dirty="0"/>
+          </a:p>
+        </p:txBody>
+      </p:sp>
+      <p:sp>
+        <p:nvSpPr>
+          <p:cNvPr id="3" name="Marcador de Posição de Conteúdo 2"/>
+          <p:cNvSpPr>
+            <a:spLocks noGrp="1"/>
+          </p:cNvSpPr>
+          <p:nvPr>
+            <p:ph sz="quarter" idx="1"/>
+          </p:nvPr>
+        </p:nvSpPr>
+        <p:spPr/>
+        <p:txBody>
+          <a:bodyPr/>
+          <a:lstStyle/>
+          <a:p>
+            <a:endParaRPr lang="pt-PT" dirty="0" smtClean="0"/>
+          </a:p>
+          <a:p>
+            <a:endParaRPr lang="pt-PT" dirty="0" smtClean="0"/>
+          </a:p>
+          <a:p>
+            <a:endParaRPr lang="pt-PT" dirty="0" smtClean="0"/>
+          </a:p>
+          <a:p>
+            <a:endParaRPr lang="pt-PT" dirty="0" smtClean="0"/>
+          </a:p>
+          <a:p>
+            <a:r>
+              <a:rPr lang="pt-PT" dirty="0" smtClean="0"/>
+              <a:t>Resultado:</a:t>
+            </a:r>
+          </a:p>
+          <a:p>
+            <a:endParaRPr lang="pt-PT" dirty="0"/>
+          </a:p>
+        </p:txBody>
+      </p:sp>
+      <p:pic>
+        <p:nvPicPr>
+          <p:cNvPr id="29698" name="Picture 2"/>
+          <p:cNvPicPr>
+            <a:picLocks noChangeAspect="1" noChangeArrowheads="1"/>
+          </p:cNvPicPr>
+          <p:nvPr/>
+        </p:nvPicPr>
+        <p:blipFill>
+          <a:blip r:embed="rId2" cstate="print"/>
+          <a:srcRect/>
+          <a:stretch>
+            <a:fillRect/>
+          </a:stretch>
+        </p:blipFill>
+        <p:spPr bwMode="auto">
+          <a:xfrm>
+            <a:off x="899592" y="3861048"/>
+            <a:ext cx="7267575" cy="590550"/>
+          </a:xfrm>
+          <a:prstGeom prst="rect">
+            <a:avLst/>
+          </a:prstGeom>
+          <a:noFill/>
+          <a:ln w="9525">
+            <a:noFill/>
+            <a:miter lim="800000"/>
+            <a:headEnd/>
+            <a:tailEnd/>
+          </a:ln>
+        </p:spPr>
+      </p:pic>
+    </p:spTree>
+  </p:cSld>
+  <p:clrMapOvr>
+    <a:masterClrMapping/>
+  </p:clrMapOvr>
 </p:sld>
 </file>
 
@@ -6734,7 +8158,31 @@
                   <a:srgbClr val="0070C0"/>
                 </a:solidFill>
               </a:rPr>
-              <a:t>Operador: OrderCrossover</a:t>
+              <a:t>Operador: </a:t>
+            </a:r>
+            <a:r>
+              <a:rPr lang="pt-PT" dirty="0" err="1" smtClean="0">
+                <a:solidFill>
+                  <a:srgbClr val="0070C0"/>
+                </a:solidFill>
+              </a:rPr>
+              <a:t>Cycle</a:t>
+            </a:r>
+            <a:r>
+              <a:rPr lang="pt-PT" dirty="0" smtClean="0">
+                <a:solidFill>
+                  <a:srgbClr val="0070C0"/>
+                </a:solidFill>
+              </a:rPr>
+              <a:t> </a:t>
+            </a:r>
+            <a:r>
+              <a:rPr lang="pt-PT" dirty="0" err="1" smtClean="0">
+                <a:solidFill>
+                  <a:srgbClr val="0070C0"/>
+                </a:solidFill>
+              </a:rPr>
+              <a:t>Crossover</a:t>
             </a:r>
             <a:endParaRPr lang="pt-PT" dirty="0">
               <a:solidFill>
@@ -6895,7 +8343,31 @@
                   <a:srgbClr val="0070C0"/>
                 </a:solidFill>
               </a:rPr>
-              <a:t>Operador: OrderCrossover</a:t>
+              <a:t>Operador: </a:t>
+            </a:r>
+            <a:r>
+              <a:rPr lang="pt-PT" dirty="0" err="1" smtClean="0">
+                <a:solidFill>
+                  <a:srgbClr val="0070C0"/>
+                </a:solidFill>
+              </a:rPr>
+              <a:t>Cycle</a:t>
+            </a:r>
+            <a:r>
+              <a:rPr lang="pt-PT" dirty="0" smtClean="0">
+                <a:solidFill>
+                  <a:srgbClr val="0070C0"/>
+                </a:solidFill>
+              </a:rPr>
+              <a:t> </a:t>
+            </a:r>
+            <a:r>
+              <a:rPr lang="pt-PT" dirty="0" err="1" smtClean="0">
+                <a:solidFill>
+                  <a:srgbClr val="0070C0"/>
+                </a:solidFill>
+              </a:rPr>
+              <a:t>Crossover</a:t>
             </a:r>
             <a:endParaRPr lang="pt-PT" dirty="0"/>
           </a:p>

</xml_diff>